<commit_message>
Comparativa entre modelos y Avance de conclusiones
</commit_message>
<xml_diff>
--- a/Presentación ejecutiva/Presentación Ejecutiva.pptx
+++ b/Presentación ejecutiva/Presentación Ejecutiva.pptx
@@ -10,6 +10,7 @@
     <p:sldId id="259" r:id="rId4"/>
     <p:sldId id="260" r:id="rId5"/>
     <p:sldId id="261" r:id="rId6"/>
+    <p:sldId id="262" r:id="rId7"/>
   </p:sldIdLst>
   <p:sldSz cx="12192000" cy="6858000"/>
   <p:notesSz cx="6858000" cy="9144000"/>
@@ -108,6 +109,11 @@
       </a:defRPr>
     </a:lvl9pPr>
   </p:defaultTextStyle>
+  <p:extLst>
+    <p:ext uri="{EFAFB233-063F-42B5-8137-9DF3F51BA10A}">
+      <p15:sldGuideLst xmlns:p15="http://schemas.microsoft.com/office/powerpoint/2012/main"/>
+    </p:ext>
+  </p:extLst>
 </p:presentation>
 </file>
 
@@ -260,7 +266,7 @@
           <a:p>
             <a:fld id="{6DF9BD5E-6E5A-40C6-B642-76CE4AF6280A}" type="datetimeFigureOut">
               <a:rPr lang="es-AR" smtClean="0"/>
-              <a:t>18/4/2022</a:t>
+              <a:t>4/5/2022</a:t>
             </a:fld>
             <a:endParaRPr lang="es-AR"/>
           </a:p>
@@ -460,7 +466,7 @@
           <a:p>
             <a:fld id="{6DF9BD5E-6E5A-40C6-B642-76CE4AF6280A}" type="datetimeFigureOut">
               <a:rPr lang="es-AR" smtClean="0"/>
-              <a:t>18/4/2022</a:t>
+              <a:t>4/5/2022</a:t>
             </a:fld>
             <a:endParaRPr lang="es-AR"/>
           </a:p>
@@ -670,7 +676,7 @@
           <a:p>
             <a:fld id="{6DF9BD5E-6E5A-40C6-B642-76CE4AF6280A}" type="datetimeFigureOut">
               <a:rPr lang="es-AR" smtClean="0"/>
-              <a:t>18/4/2022</a:t>
+              <a:t>4/5/2022</a:t>
             </a:fld>
             <a:endParaRPr lang="es-AR"/>
           </a:p>
@@ -870,7 +876,7 @@
           <a:p>
             <a:fld id="{6DF9BD5E-6E5A-40C6-B642-76CE4AF6280A}" type="datetimeFigureOut">
               <a:rPr lang="es-AR" smtClean="0"/>
-              <a:t>18/4/2022</a:t>
+              <a:t>4/5/2022</a:t>
             </a:fld>
             <a:endParaRPr lang="es-AR"/>
           </a:p>
@@ -1146,7 +1152,7 @@
           <a:p>
             <a:fld id="{6DF9BD5E-6E5A-40C6-B642-76CE4AF6280A}" type="datetimeFigureOut">
               <a:rPr lang="es-AR" smtClean="0"/>
-              <a:t>18/4/2022</a:t>
+              <a:t>4/5/2022</a:t>
             </a:fld>
             <a:endParaRPr lang="es-AR"/>
           </a:p>
@@ -1414,7 +1420,7 @@
           <a:p>
             <a:fld id="{6DF9BD5E-6E5A-40C6-B642-76CE4AF6280A}" type="datetimeFigureOut">
               <a:rPr lang="es-AR" smtClean="0"/>
-              <a:t>18/4/2022</a:t>
+              <a:t>4/5/2022</a:t>
             </a:fld>
             <a:endParaRPr lang="es-AR"/>
           </a:p>
@@ -1829,7 +1835,7 @@
           <a:p>
             <a:fld id="{6DF9BD5E-6E5A-40C6-B642-76CE4AF6280A}" type="datetimeFigureOut">
               <a:rPr lang="es-AR" smtClean="0"/>
-              <a:t>18/4/2022</a:t>
+              <a:t>4/5/2022</a:t>
             </a:fld>
             <a:endParaRPr lang="es-AR"/>
           </a:p>
@@ -1971,7 +1977,7 @@
           <a:p>
             <a:fld id="{6DF9BD5E-6E5A-40C6-B642-76CE4AF6280A}" type="datetimeFigureOut">
               <a:rPr lang="es-AR" smtClean="0"/>
-              <a:t>18/4/2022</a:t>
+              <a:t>4/5/2022</a:t>
             </a:fld>
             <a:endParaRPr lang="es-AR"/>
           </a:p>
@@ -2084,7 +2090,7 @@
           <a:p>
             <a:fld id="{6DF9BD5E-6E5A-40C6-B642-76CE4AF6280A}" type="datetimeFigureOut">
               <a:rPr lang="es-AR" smtClean="0"/>
-              <a:t>18/4/2022</a:t>
+              <a:t>4/5/2022</a:t>
             </a:fld>
             <a:endParaRPr lang="es-AR"/>
           </a:p>
@@ -2397,7 +2403,7 @@
           <a:p>
             <a:fld id="{6DF9BD5E-6E5A-40C6-B642-76CE4AF6280A}" type="datetimeFigureOut">
               <a:rPr lang="es-AR" smtClean="0"/>
-              <a:t>18/4/2022</a:t>
+              <a:t>4/5/2022</a:t>
             </a:fld>
             <a:endParaRPr lang="es-AR"/>
           </a:p>
@@ -2686,7 +2692,7 @@
           <a:p>
             <a:fld id="{6DF9BD5E-6E5A-40C6-B642-76CE4AF6280A}" type="datetimeFigureOut">
               <a:rPr lang="es-AR" smtClean="0"/>
-              <a:t>18/4/2022</a:t>
+              <a:t>4/5/2022</a:t>
             </a:fld>
             <a:endParaRPr lang="es-AR"/>
           </a:p>
@@ -2929,7 +2935,7 @@
           <a:p>
             <a:fld id="{6DF9BD5E-6E5A-40C6-B642-76CE4AF6280A}" type="datetimeFigureOut">
               <a:rPr lang="es-AR" smtClean="0"/>
-              <a:t>18/4/2022</a:t>
+              <a:t>4/5/2022</a:t>
             </a:fld>
             <a:endParaRPr lang="es-AR"/>
           </a:p>
@@ -5753,7 +5759,55 @@
                 <a:cs typeface="Anton"/>
                 <a:sym typeface="Anton"/>
               </a:rPr>
-              <a:t>“Modelo candidato: PCA”</a:t>
+              <a:t>“Modelo candidato: PCA – </a:t>
+            </a:r>
+            <a:r>
+              <a:rPr lang="es-AR" sz="2800" i="1" dirty="0" err="1">
+                <a:solidFill>
+                  <a:schemeClr val="tx2"/>
+                </a:solidFill>
+                <a:latin typeface="Anton"/>
+                <a:ea typeface="Anton"/>
+                <a:cs typeface="Anton"/>
+                <a:sym typeface="Anton"/>
+              </a:rPr>
+              <a:t>Random</a:t>
+            </a:r>
+            <a:r>
+              <a:rPr lang="es-AR" sz="2800" i="1" dirty="0">
+                <a:solidFill>
+                  <a:schemeClr val="tx2"/>
+                </a:solidFill>
+                <a:latin typeface="Anton"/>
+                <a:ea typeface="Anton"/>
+                <a:cs typeface="Anton"/>
+                <a:sym typeface="Anton"/>
+              </a:rPr>
+              <a:t> Forest , K-</a:t>
+            </a:r>
+            <a:r>
+              <a:rPr lang="es-AR" sz="2800" i="1" dirty="0" err="1">
+                <a:solidFill>
+                  <a:schemeClr val="tx2"/>
+                </a:solidFill>
+                <a:latin typeface="Anton"/>
+                <a:ea typeface="Anton"/>
+                <a:cs typeface="Anton"/>
+                <a:sym typeface="Anton"/>
+              </a:rPr>
+              <a:t>Means</a:t>
+            </a:r>
+            <a:r>
+              <a:rPr lang="es-AR" sz="2800" i="1" dirty="0">
+                <a:solidFill>
+                  <a:schemeClr val="tx2"/>
+                </a:solidFill>
+                <a:latin typeface="Anton"/>
+                <a:ea typeface="Anton"/>
+                <a:cs typeface="Anton"/>
+                <a:sym typeface="Anton"/>
+              </a:rPr>
+              <a:t>”</a:t>
             </a:r>
           </a:p>
         </p:txBody>
@@ -5929,6 +5983,451 @@
     <p:extLst>
       <p:ext uri="{BB962C8B-B14F-4D97-AF65-F5344CB8AC3E}">
         <p14:creationId xmlns:p14="http://schemas.microsoft.com/office/powerpoint/2010/main" val="1206520730"/>
+      </p:ext>
+    </p:extLst>
+  </p:cSld>
+  <p:clrMapOvr>
+    <a:masterClrMapping/>
+  </p:clrMapOvr>
+</p:sld>
+</file>
+
+<file path=ppt/slides/slide6.xml><?xml version="1.0" encoding="utf-8"?>
+<p:sld xmlns:a="http://schemas.openxmlformats.org/drawingml/2006/main" xmlns:r="http://schemas.openxmlformats.org/officeDocument/2006/relationships" xmlns:p="http://schemas.openxmlformats.org/presentationml/2006/main">
+  <p:cSld>
+    <p:spTree>
+      <p:nvGrpSpPr>
+        <p:cNvPr id="1" name=""/>
+        <p:cNvGrpSpPr/>
+        <p:nvPr/>
+      </p:nvGrpSpPr>
+      <p:grpSpPr>
+        <a:xfrm>
+          <a:off x="0" y="0"/>
+          <a:ext cx="0" cy="0"/>
+          <a:chOff x="0" y="0"/>
+          <a:chExt cx="0" cy="0"/>
+        </a:xfrm>
+      </p:grpSpPr>
+      <p:grpSp>
+        <p:nvGrpSpPr>
+          <p:cNvPr id="4" name="Google Shape;205;p25">
+            <a:extLst>
+              <a:ext uri="{FF2B5EF4-FFF2-40B4-BE49-F238E27FC236}">
+                <a16:creationId xmlns:a16="http://schemas.microsoft.com/office/drawing/2014/main" id="{C0A2154D-69B4-49A8-B34D-7D5EC7562EE3}"/>
+              </a:ext>
+            </a:extLst>
+          </p:cNvPr>
+          <p:cNvGrpSpPr/>
+          <p:nvPr/>
+        </p:nvGrpSpPr>
+        <p:grpSpPr>
+          <a:xfrm>
+            <a:off x="11089400" y="86293"/>
+            <a:ext cx="689725" cy="681980"/>
+            <a:chOff x="3882275" y="708249"/>
+            <a:chExt cx="1379450" cy="1379450"/>
+          </a:xfrm>
+        </p:grpSpPr>
+        <p:pic>
+          <p:nvPicPr>
+            <p:cNvPr id="5" name="Google Shape;206;p25">
+              <a:extLst>
+                <a:ext uri="{FF2B5EF4-FFF2-40B4-BE49-F238E27FC236}">
+                  <a16:creationId xmlns:a16="http://schemas.microsoft.com/office/drawing/2014/main" id="{1E52C181-4D93-4FF5-8C25-C37993B98050}"/>
+                </a:ext>
+              </a:extLst>
+            </p:cNvPr>
+            <p:cNvPicPr preferRelativeResize="0"/>
+            <p:nvPr/>
+          </p:nvPicPr>
+          <p:blipFill rotWithShape="1">
+            <a:blip r:embed="rId2">
+              <a:alphaModFix/>
+            </a:blip>
+            <a:srcRect/>
+            <a:stretch/>
+          </p:blipFill>
+          <p:spPr>
+            <a:xfrm>
+              <a:off x="3882275" y="708249"/>
+              <a:ext cx="1379450" cy="1379450"/>
+            </a:xfrm>
+            <a:prstGeom prst="rect">
+              <a:avLst/>
+            </a:prstGeom>
+            <a:noFill/>
+            <a:ln>
+              <a:noFill/>
+            </a:ln>
+          </p:spPr>
+        </p:pic>
+        <p:sp>
+          <p:nvSpPr>
+            <p:cNvPr id="6" name="Google Shape;207;p25">
+              <a:extLst>
+                <a:ext uri="{FF2B5EF4-FFF2-40B4-BE49-F238E27FC236}">
+                  <a16:creationId xmlns:a16="http://schemas.microsoft.com/office/drawing/2014/main" id="{6248B5E0-836A-41D4-809E-9F9144F680B3}"/>
+                </a:ext>
+              </a:extLst>
+            </p:cNvPr>
+            <p:cNvSpPr/>
+            <p:nvPr/>
+          </p:nvSpPr>
+          <p:spPr>
+            <a:xfrm>
+              <a:off x="4823975" y="799475"/>
+              <a:ext cx="381900" cy="381900"/>
+            </a:xfrm>
+            <a:prstGeom prst="ellipse">
+              <a:avLst/>
+            </a:prstGeom>
+            <a:solidFill>
+              <a:srgbClr val="222222"/>
+            </a:solidFill>
+            <a:ln>
+              <a:noFill/>
+            </a:ln>
+          </p:spPr>
+          <p:txBody>
+            <a:bodyPr spcFirstLastPara="1" wrap="square" lIns="91425" tIns="91425" rIns="91425" bIns="91425" anchor="ctr" anchorCtr="0">
+              <a:noAutofit/>
+            </a:bodyPr>
+            <a:lstStyle/>
+            <a:p>
+              <a:pPr marL="0" marR="0" lvl="0" indent="0" algn="ctr" rtl="0">
+                <a:spcBef>
+                  <a:spcPts val="0"/>
+                </a:spcBef>
+                <a:spcAft>
+                  <a:spcPts val="0"/>
+                </a:spcAft>
+                <a:buNone/>
+              </a:pPr>
+              <a:r>
+                <a:rPr lang="es" b="1">
+                  <a:solidFill>
+                    <a:srgbClr val="FFFFFF"/>
+                  </a:solidFill>
+                  <a:latin typeface="Helvetica Neue"/>
+                  <a:ea typeface="Helvetica Neue"/>
+                  <a:cs typeface="Helvetica Neue"/>
+                  <a:sym typeface="Helvetica Neue"/>
+                </a:rPr>
+                <a:t>2</a:t>
+              </a:r>
+              <a:endParaRPr b="1">
+                <a:solidFill>
+                  <a:srgbClr val="FFFFFF"/>
+                </a:solidFill>
+                <a:latin typeface="Helvetica Neue"/>
+                <a:ea typeface="Helvetica Neue"/>
+                <a:cs typeface="Helvetica Neue"/>
+                <a:sym typeface="Helvetica Neue"/>
+              </a:endParaRPr>
+            </a:p>
+          </p:txBody>
+        </p:sp>
+      </p:grpSp>
+      <p:sp>
+        <p:nvSpPr>
+          <p:cNvPr id="8" name="Google Shape;203;p25">
+            <a:extLst>
+              <a:ext uri="{FF2B5EF4-FFF2-40B4-BE49-F238E27FC236}">
+                <a16:creationId xmlns:a16="http://schemas.microsoft.com/office/drawing/2014/main" id="{07677C41-FA2A-4785-90FF-55CA13E992A5}"/>
+              </a:ext>
+            </a:extLst>
+          </p:cNvPr>
+          <p:cNvSpPr txBox="1"/>
+          <p:nvPr/>
+        </p:nvSpPr>
+        <p:spPr>
+          <a:xfrm>
+            <a:off x="4170879" y="807773"/>
+            <a:ext cx="7201738" cy="1116563"/>
+          </a:xfrm>
+          <a:prstGeom prst="rect">
+            <a:avLst/>
+          </a:prstGeom>
+          <a:noFill/>
+          <a:ln>
+            <a:noFill/>
+          </a:ln>
+        </p:spPr>
+        <p:txBody>
+          <a:bodyPr spcFirstLastPara="1" wrap="square" lIns="91425" tIns="91425" rIns="91425" bIns="91425" anchor="t" anchorCtr="0">
+            <a:noAutofit/>
+          </a:bodyPr>
+          <a:lstStyle/>
+          <a:p>
+            <a:pPr algn="ctr"/>
+            <a:r>
+              <a:rPr lang="es-AR" sz="2800" i="1" dirty="0">
+                <a:solidFill>
+                  <a:schemeClr val="tx2"/>
+                </a:solidFill>
+                <a:latin typeface="Anton"/>
+                <a:ea typeface="Anton"/>
+                <a:cs typeface="Anton"/>
+                <a:sym typeface="Anton"/>
+              </a:rPr>
+              <a:t>“Conclusiones”</a:t>
+            </a:r>
+          </a:p>
+        </p:txBody>
+      </p:sp>
+      <p:pic>
+        <p:nvPicPr>
+          <p:cNvPr id="5122" name="Picture 2" descr="Los perfiles profesionales en el mundo de los datos">
+            <a:extLst>
+              <a:ext uri="{FF2B5EF4-FFF2-40B4-BE49-F238E27FC236}">
+                <a16:creationId xmlns:a16="http://schemas.microsoft.com/office/drawing/2014/main" id="{BB8B111C-1FDD-430B-BE18-5F40301453DE}"/>
+              </a:ext>
+            </a:extLst>
+          </p:cNvPr>
+          <p:cNvPicPr>
+            <a:picLocks noChangeAspect="1" noChangeArrowheads="1"/>
+          </p:cNvPicPr>
+          <p:nvPr/>
+        </p:nvPicPr>
+        <p:blipFill>
+          <a:blip r:embed="rId3">
+            <a:extLst>
+              <a:ext uri="{28A0092B-C50C-407E-A947-70E740481C1C}">
+                <a14:useLocalDpi xmlns:a14="http://schemas.microsoft.com/office/drawing/2010/main" val="0"/>
+              </a:ext>
+            </a:extLst>
+          </a:blip>
+          <a:srcRect/>
+          <a:stretch>
+            <a:fillRect/>
+          </a:stretch>
+        </p:blipFill>
+        <p:spPr bwMode="auto">
+          <a:xfrm>
+            <a:off x="0" y="0"/>
+            <a:ext cx="4170879" cy="1793478"/>
+          </a:xfrm>
+          <a:prstGeom prst="rect">
+            <a:avLst/>
+          </a:prstGeom>
+          <a:noFill/>
+          <a:extLst>
+            <a:ext uri="{909E8E84-426E-40DD-AFC4-6F175D3DCCD1}">
+              <a14:hiddenFill xmlns:a14="http://schemas.microsoft.com/office/drawing/2010/main">
+                <a:solidFill>
+                  <a:srgbClr val="FFFFFF"/>
+                </a:solidFill>
+              </a14:hiddenFill>
+            </a:ext>
+          </a:extLst>
+        </p:spPr>
+      </p:pic>
+      <p:sp>
+        <p:nvSpPr>
+          <p:cNvPr id="12" name="TextBox 11">
+            <a:extLst>
+              <a:ext uri="{FF2B5EF4-FFF2-40B4-BE49-F238E27FC236}">
+                <a16:creationId xmlns:a16="http://schemas.microsoft.com/office/drawing/2014/main" id="{867A0A95-85FF-1B40-00E6-F74C1533510C}"/>
+              </a:ext>
+            </a:extLst>
+          </p:cNvPr>
+          <p:cNvSpPr txBox="1"/>
+          <p:nvPr/>
+        </p:nvSpPr>
+        <p:spPr>
+          <a:xfrm>
+            <a:off x="344606" y="2139586"/>
+            <a:ext cx="11215644" cy="307777"/>
+          </a:xfrm>
+          <a:prstGeom prst="rect">
+            <a:avLst/>
+          </a:prstGeom>
+          <a:noFill/>
+        </p:spPr>
+        <p:txBody>
+          <a:bodyPr wrap="square">
+            <a:spAutoFit/>
+          </a:bodyPr>
+          <a:lstStyle/>
+          <a:p>
+            <a:pPr marL="228600" indent="-228600">
+              <a:buAutoNum type="arabicParenR"/>
+            </a:pPr>
+            <a:r>
+              <a:rPr lang="es-AR" sz="1400" b="1" dirty="0">
+                <a:solidFill>
+                  <a:schemeClr val="tx2">
+                    <a:lumMod val="50000"/>
+                  </a:schemeClr>
+                </a:solidFill>
+                <a:effectLst>
+                  <a:outerShdw blurRad="38100" dist="38100" dir="2700000" algn="tl">
+                    <a:srgbClr val="000000">
+                      <a:alpha val="43137"/>
+                    </a:srgbClr>
+                  </a:outerShdw>
+                </a:effectLst>
+                <a:latin typeface="Consolas" panose="020B0609020204030204" pitchFamily="49" charset="0"/>
+              </a:rPr>
+              <a:t>De acuerdo al </a:t>
+            </a:r>
+            <a:r>
+              <a:rPr lang="es-AR" sz="1400" b="1" dirty="0" err="1">
+                <a:solidFill>
+                  <a:schemeClr val="tx2">
+                    <a:lumMod val="50000"/>
+                  </a:schemeClr>
+                </a:solidFill>
+                <a:effectLst>
+                  <a:outerShdw blurRad="38100" dist="38100" dir="2700000" algn="tl">
+                    <a:srgbClr val="000000">
+                      <a:alpha val="43137"/>
+                    </a:srgbClr>
+                  </a:outerShdw>
+                </a:effectLst>
+                <a:latin typeface="Consolas" panose="020B0609020204030204" pitchFamily="49" charset="0"/>
+              </a:rPr>
+              <a:t>dataset</a:t>
+            </a:r>
+            <a:r>
+              <a:rPr lang="es-AR" sz="1400" b="1" dirty="0">
+                <a:solidFill>
+                  <a:schemeClr val="tx2">
+                    <a:lumMod val="50000"/>
+                  </a:schemeClr>
+                </a:solidFill>
+                <a:effectLst>
+                  <a:outerShdw blurRad="38100" dist="38100" dir="2700000" algn="tl">
+                    <a:srgbClr val="000000">
+                      <a:alpha val="43137"/>
+                    </a:srgbClr>
+                  </a:outerShdw>
+                </a:effectLst>
+                <a:latin typeface="Consolas" panose="020B0609020204030204" pitchFamily="49" charset="0"/>
+              </a:rPr>
+              <a:t> o </a:t>
+            </a:r>
+            <a:r>
+              <a:rPr lang="es-AR" sz="1400" b="1" dirty="0" err="1">
+                <a:solidFill>
+                  <a:schemeClr val="tx2">
+                    <a:lumMod val="50000"/>
+                  </a:schemeClr>
+                </a:solidFill>
+                <a:effectLst>
+                  <a:outerShdw blurRad="38100" dist="38100" dir="2700000" algn="tl">
+                    <a:srgbClr val="000000">
+                      <a:alpha val="43137"/>
+                    </a:srgbClr>
+                  </a:outerShdw>
+                </a:effectLst>
+                <a:latin typeface="Consolas" panose="020B0609020204030204" pitchFamily="49" charset="0"/>
+              </a:rPr>
+              <a:t>datasets</a:t>
+            </a:r>
+            <a:r>
+              <a:rPr lang="es-AR" sz="1400" b="1" dirty="0">
+                <a:solidFill>
+                  <a:schemeClr val="tx2">
+                    <a:lumMod val="50000"/>
+                  </a:schemeClr>
+                </a:solidFill>
+                <a:effectLst>
+                  <a:outerShdw blurRad="38100" dist="38100" dir="2700000" algn="tl">
+                    <a:srgbClr val="000000">
+                      <a:alpha val="43137"/>
+                    </a:srgbClr>
+                  </a:outerShdw>
+                </a:effectLst>
+                <a:latin typeface="Consolas" panose="020B0609020204030204" pitchFamily="49" charset="0"/>
+              </a:rPr>
+              <a:t> a considerar para este proyecto, cual es nivel de contagios a Nivel Global?</a:t>
+            </a:r>
+          </a:p>
+        </p:txBody>
+      </p:sp>
+      <p:pic>
+        <p:nvPicPr>
+          <p:cNvPr id="1026" name="Picture 2" descr="El impacto del coronavirus en la industria de consumo a nivel global |  Revista NEO">
+            <a:extLst>
+              <a:ext uri="{FF2B5EF4-FFF2-40B4-BE49-F238E27FC236}">
+                <a16:creationId xmlns:a16="http://schemas.microsoft.com/office/drawing/2014/main" id="{F834E68A-7261-5D87-9A93-986356EB54CB}"/>
+              </a:ext>
+            </a:extLst>
+          </p:cNvPr>
+          <p:cNvPicPr>
+            <a:picLocks noChangeAspect="1" noChangeArrowheads="1"/>
+          </p:cNvPicPr>
+          <p:nvPr/>
+        </p:nvPicPr>
+        <p:blipFill>
+          <a:blip r:embed="rId4">
+            <a:extLst>
+              <a:ext uri="{28A0092B-C50C-407E-A947-70E740481C1C}">
+                <a14:useLocalDpi xmlns:a14="http://schemas.microsoft.com/office/drawing/2010/main" val="0"/>
+              </a:ext>
+            </a:extLst>
+          </a:blip>
+          <a:srcRect/>
+          <a:stretch>
+            <a:fillRect/>
+          </a:stretch>
+        </p:blipFill>
+        <p:spPr bwMode="auto">
+          <a:xfrm>
+            <a:off x="344606" y="2578873"/>
+            <a:ext cx="2481228" cy="1574964"/>
+          </a:xfrm>
+          <a:prstGeom prst="rect">
+            <a:avLst/>
+          </a:prstGeom>
+          <a:noFill/>
+          <a:extLst>
+            <a:ext uri="{909E8E84-426E-40DD-AFC4-6F175D3DCCD1}">
+              <a14:hiddenFill xmlns:a14="http://schemas.microsoft.com/office/drawing/2010/main">
+                <a:solidFill>
+                  <a:srgbClr val="FFFFFF"/>
+                </a:solidFill>
+              </a14:hiddenFill>
+            </a:ext>
+          </a:extLst>
+        </p:spPr>
+      </p:pic>
+      <p:pic>
+        <p:nvPicPr>
+          <p:cNvPr id="9" name="Picture 8">
+            <a:extLst>
+              <a:ext uri="{FF2B5EF4-FFF2-40B4-BE49-F238E27FC236}">
+                <a16:creationId xmlns:a16="http://schemas.microsoft.com/office/drawing/2014/main" id="{58866AA4-9F83-66EF-8B25-BBC9DD463034}"/>
+              </a:ext>
+            </a:extLst>
+          </p:cNvPr>
+          <p:cNvPicPr>
+            <a:picLocks noChangeAspect="1"/>
+          </p:cNvPicPr>
+          <p:nvPr/>
+        </p:nvPicPr>
+        <p:blipFill>
+          <a:blip r:embed="rId5"/>
+          <a:stretch>
+            <a:fillRect/>
+          </a:stretch>
+        </p:blipFill>
+        <p:spPr>
+          <a:xfrm>
+            <a:off x="2997340" y="2578873"/>
+            <a:ext cx="7989131" cy="1574964"/>
+          </a:xfrm>
+          <a:prstGeom prst="rect">
+            <a:avLst/>
+          </a:prstGeom>
+        </p:spPr>
+      </p:pic>
+    </p:spTree>
+    <p:extLst>
+      <p:ext uri="{BB962C8B-B14F-4D97-AF65-F5344CB8AC3E}">
+        <p14:creationId xmlns:p14="http://schemas.microsoft.com/office/powerpoint/2010/main" val="3246994188"/>
       </p:ext>
     </p:extLst>
   </p:cSld>

</xml_diff>